<commit_message>
Teacher Payment spreadsheet created
</commit_message>
<xml_diff>
--- a/Offline/TeacherRecruitment/TeacherProfiles.pptx
+++ b/Offline/TeacherRecruitment/TeacherProfiles.pptx
@@ -5,12 +5,13 @@
     <p:sldMasterId id="2147483684" r:id="rId1"/>
   </p:sldMasterIdLst>
   <p:notesMasterIdLst>
-    <p:notesMasterId r:id="rId5"/>
+    <p:notesMasterId r:id="rId6"/>
   </p:notesMasterIdLst>
   <p:sldIdLst>
     <p:sldId id="256" r:id="rId2"/>
     <p:sldId id="257" r:id="rId3"/>
     <p:sldId id="258" r:id="rId4"/>
+    <p:sldId id="259" r:id="rId5"/>
   </p:sldIdLst>
   <p:sldSz cx="6858000" cy="9906000" type="A4"/>
   <p:notesSz cx="6858000" cy="9144000"/>
@@ -109,6 +110,11 @@
       </a:defRPr>
     </a:lvl9pPr>
   </p:defaultTextStyle>
+  <p:extLst>
+    <p:ext uri="{EFAFB233-063F-42B5-8137-9DF3F51BA10A}">
+      <p15:sldGuideLst xmlns:p15="http://schemas.microsoft.com/office/powerpoint/2012/main"/>
+    </p:ext>
+  </p:extLst>
 </p:presentation>
 </file>
 
@@ -194,7 +200,7 @@
           <a:p>
             <a:fld id="{6764DD48-56A0-4B4D-A41F-45145E2B25F0}" type="datetimeFigureOut">
               <a:rPr lang="en-AU" smtClean="0"/>
-              <a:t>1/06/2023</a:t>
+              <a:t>4/06/2023</a:t>
             </a:fld>
             <a:endParaRPr lang="en-AU"/>
           </a:p>
@@ -546,6 +552,90 @@
 </p:notes>
 </file>
 
+<file path=ppt/notesSlides/notesSlide2.xml><?xml version="1.0" encoding="utf-8"?>
+<p:notes xmlns:a="http://schemas.openxmlformats.org/drawingml/2006/main" xmlns:r="http://schemas.openxmlformats.org/officeDocument/2006/relationships" xmlns:p="http://schemas.openxmlformats.org/presentationml/2006/main">
+  <p:cSld>
+    <p:spTree>
+      <p:nvGrpSpPr>
+        <p:cNvPr id="1" name=""/>
+        <p:cNvGrpSpPr/>
+        <p:nvPr/>
+      </p:nvGrpSpPr>
+      <p:grpSpPr>
+        <a:xfrm>
+          <a:off x="0" y="0"/>
+          <a:ext cx="0" cy="0"/>
+          <a:chOff x="0" y="0"/>
+          <a:chExt cx="0" cy="0"/>
+        </a:xfrm>
+      </p:grpSpPr>
+      <p:sp>
+        <p:nvSpPr>
+          <p:cNvPr id="2" name="Slide Image Placeholder 1"/>
+          <p:cNvSpPr>
+            <a:spLocks noGrp="1" noRot="1" noChangeAspect="1"/>
+          </p:cNvSpPr>
+          <p:nvPr>
+            <p:ph type="sldImg"/>
+          </p:nvPr>
+        </p:nvSpPr>
+        <p:spPr/>
+      </p:sp>
+      <p:sp>
+        <p:nvSpPr>
+          <p:cNvPr id="3" name="Notes Placeholder 2"/>
+          <p:cNvSpPr>
+            <a:spLocks noGrp="1"/>
+          </p:cNvSpPr>
+          <p:nvPr>
+            <p:ph type="body" idx="1"/>
+          </p:nvPr>
+        </p:nvSpPr>
+        <p:spPr/>
+        <p:txBody>
+          <a:bodyPr/>
+          <a:lstStyle/>
+          <a:p>
+            <a:endParaRPr lang="en-AU" dirty="0"/>
+          </a:p>
+        </p:txBody>
+      </p:sp>
+      <p:sp>
+        <p:nvSpPr>
+          <p:cNvPr id="4" name="Slide Number Placeholder 3"/>
+          <p:cNvSpPr>
+            <a:spLocks noGrp="1"/>
+          </p:cNvSpPr>
+          <p:nvPr>
+            <p:ph type="sldNum" sz="quarter" idx="10"/>
+          </p:nvPr>
+        </p:nvSpPr>
+        <p:spPr/>
+        <p:txBody>
+          <a:bodyPr/>
+          <a:lstStyle/>
+          <a:p>
+            <a:fld id="{42B418AD-C6CF-4435-83C2-98AD00D4BAE8}" type="slidenum">
+              <a:rPr lang="en-AU" smtClean="0"/>
+              <a:t>4</a:t>
+            </a:fld>
+            <a:endParaRPr lang="en-AU"/>
+          </a:p>
+        </p:txBody>
+      </p:sp>
+    </p:spTree>
+    <p:extLst>
+      <p:ext uri="{BB962C8B-B14F-4D97-AF65-F5344CB8AC3E}">
+        <p14:creationId xmlns:p14="http://schemas.microsoft.com/office/powerpoint/2010/main" val="405947843"/>
+      </p:ext>
+    </p:extLst>
+  </p:cSld>
+  <p:clrMapOvr>
+    <a:masterClrMapping/>
+  </p:clrMapOvr>
+</p:notes>
+</file>
+
 <file path=ppt/slideLayouts/slideLayout1.xml><?xml version="1.0" encoding="utf-8"?>
 <p:sldLayout xmlns:a="http://schemas.openxmlformats.org/drawingml/2006/main" xmlns:r="http://schemas.openxmlformats.org/officeDocument/2006/relationships" xmlns:p="http://schemas.openxmlformats.org/presentationml/2006/main" type="title" preserve="1">
   <p:cSld name="Title Slide">
@@ -677,7 +767,7 @@
           <a:p>
             <a:fld id="{9E4B7CBB-5626-4F1A-8460-268C0F5172D8}" type="datetimeFigureOut">
               <a:rPr lang="en-AU" smtClean="0"/>
-              <a:t>1/06/2023</a:t>
+              <a:t>4/06/2023</a:t>
             </a:fld>
             <a:endParaRPr lang="en-AU"/>
           </a:p>
@@ -847,7 +937,7 @@
           <a:p>
             <a:fld id="{9E4B7CBB-5626-4F1A-8460-268C0F5172D8}" type="datetimeFigureOut">
               <a:rPr lang="en-AU" smtClean="0"/>
-              <a:t>1/06/2023</a:t>
+              <a:t>4/06/2023</a:t>
             </a:fld>
             <a:endParaRPr lang="en-AU"/>
           </a:p>
@@ -1027,7 +1117,7 @@
           <a:p>
             <a:fld id="{9E4B7CBB-5626-4F1A-8460-268C0F5172D8}" type="datetimeFigureOut">
               <a:rPr lang="en-AU" smtClean="0"/>
-              <a:t>1/06/2023</a:t>
+              <a:t>4/06/2023</a:t>
             </a:fld>
             <a:endParaRPr lang="en-AU"/>
           </a:p>
@@ -1197,7 +1287,7 @@
           <a:p>
             <a:fld id="{9E4B7CBB-5626-4F1A-8460-268C0F5172D8}" type="datetimeFigureOut">
               <a:rPr lang="en-AU" smtClean="0"/>
-              <a:t>1/06/2023</a:t>
+              <a:t>4/06/2023</a:t>
             </a:fld>
             <a:endParaRPr lang="en-AU"/>
           </a:p>
@@ -1441,7 +1531,7 @@
           <a:p>
             <a:fld id="{9E4B7CBB-5626-4F1A-8460-268C0F5172D8}" type="datetimeFigureOut">
               <a:rPr lang="en-AU" smtClean="0"/>
-              <a:t>1/06/2023</a:t>
+              <a:t>4/06/2023</a:t>
             </a:fld>
             <a:endParaRPr lang="en-AU"/>
           </a:p>
@@ -1673,7 +1763,7 @@
           <a:p>
             <a:fld id="{9E4B7CBB-5626-4F1A-8460-268C0F5172D8}" type="datetimeFigureOut">
               <a:rPr lang="en-AU" smtClean="0"/>
-              <a:t>1/06/2023</a:t>
+              <a:t>4/06/2023</a:t>
             </a:fld>
             <a:endParaRPr lang="en-AU"/>
           </a:p>
@@ -2040,7 +2130,7 @@
           <a:p>
             <a:fld id="{9E4B7CBB-5626-4F1A-8460-268C0F5172D8}" type="datetimeFigureOut">
               <a:rPr lang="en-AU" smtClean="0"/>
-              <a:t>1/06/2023</a:t>
+              <a:t>4/06/2023</a:t>
             </a:fld>
             <a:endParaRPr lang="en-AU"/>
           </a:p>
@@ -2158,7 +2248,7 @@
           <a:p>
             <a:fld id="{9E4B7CBB-5626-4F1A-8460-268C0F5172D8}" type="datetimeFigureOut">
               <a:rPr lang="en-AU" smtClean="0"/>
-              <a:t>1/06/2023</a:t>
+              <a:t>4/06/2023</a:t>
             </a:fld>
             <a:endParaRPr lang="en-AU"/>
           </a:p>
@@ -2253,7 +2343,7 @@
           <a:p>
             <a:fld id="{9E4B7CBB-5626-4F1A-8460-268C0F5172D8}" type="datetimeFigureOut">
               <a:rPr lang="en-AU" smtClean="0"/>
-              <a:t>1/06/2023</a:t>
+              <a:t>4/06/2023</a:t>
             </a:fld>
             <a:endParaRPr lang="en-AU"/>
           </a:p>
@@ -2530,7 +2620,7 @@
           <a:p>
             <a:fld id="{9E4B7CBB-5626-4F1A-8460-268C0F5172D8}" type="datetimeFigureOut">
               <a:rPr lang="en-AU" smtClean="0"/>
-              <a:t>1/06/2023</a:t>
+              <a:t>4/06/2023</a:t>
             </a:fld>
             <a:endParaRPr lang="en-AU"/>
           </a:p>
@@ -2787,7 +2877,7 @@
           <a:p>
             <a:fld id="{9E4B7CBB-5626-4F1A-8460-268C0F5172D8}" type="datetimeFigureOut">
               <a:rPr lang="en-AU" smtClean="0"/>
-              <a:t>1/06/2023</a:t>
+              <a:t>4/06/2023</a:t>
             </a:fld>
             <a:endParaRPr lang="en-AU"/>
           </a:p>
@@ -3000,7 +3090,7 @@
           <a:p>
             <a:fld id="{9E4B7CBB-5626-4F1A-8460-268C0F5172D8}" type="datetimeFigureOut">
               <a:rPr lang="en-AU" smtClean="0"/>
-              <a:t>1/06/2023</a:t>
+              <a:t>4/06/2023</a:t>
             </a:fld>
             <a:endParaRPr lang="en-AU"/>
           </a:p>
@@ -3636,23 +3726,8 @@
                 </a:solidFill>
                 <a:latin typeface="Oxygen" panose="02000503000000000000" pitchFamily="2" charset="0"/>
               </a:rPr>
-              <a:t>8 Yrs Exp. &amp; </a:t>
-            </a:r>
-            <a:r>
-              <a:rPr lang="en-US" sz="1600" b="1" dirty="0" smtClean="0">
-                <a:solidFill>
-                  <a:srgbClr val="FF8C52"/>
-                </a:solidFill>
-                <a:latin typeface="Oxygen" panose="02000503000000000000" pitchFamily="2" charset="0"/>
-              </a:rPr>
-              <a:t>Detail Oriented</a:t>
-            </a:r>
-            <a:endParaRPr lang="en-US" sz="1600" b="1" dirty="0" smtClean="0">
-              <a:solidFill>
-                <a:srgbClr val="FF8C52"/>
-              </a:solidFill>
-              <a:latin typeface="Oxygen" panose="02000503000000000000" pitchFamily="2" charset="0"/>
-            </a:endParaRPr>
+              <a:t>8 Yrs Exp. &amp; Detail Oriented</a:t>
+            </a:r>
           </a:p>
         </p:txBody>
       </p:sp>
@@ -4308,23 +4383,8 @@
                 </a:solidFill>
                 <a:latin typeface="Oxygen" panose="02000503000000000000" pitchFamily="2" charset="0"/>
               </a:rPr>
-              <a:t>8 Yrs Exp. &amp; </a:t>
-            </a:r>
-            <a:r>
-              <a:rPr lang="en-US" sz="1600" b="1" dirty="0" smtClean="0">
-                <a:solidFill>
-                  <a:schemeClr val="bg1"/>
-                </a:solidFill>
-                <a:latin typeface="Oxygen" panose="02000503000000000000" pitchFamily="2" charset="0"/>
-              </a:rPr>
-              <a:t>Detail Oriented</a:t>
-            </a:r>
-            <a:endParaRPr lang="en-US" sz="1600" b="1" dirty="0" smtClean="0">
-              <a:solidFill>
-                <a:schemeClr val="bg1"/>
-              </a:solidFill>
-              <a:latin typeface="Oxygen" panose="02000503000000000000" pitchFamily="2" charset="0"/>
-            </a:endParaRPr>
+              <a:t>8 Yrs Exp. &amp; Detail Oriented</a:t>
+            </a:r>
           </a:p>
         </p:txBody>
       </p:sp>
@@ -4816,6 +4876,812 @@
     <p:extLst>
       <p:ext uri="{BB962C8B-B14F-4D97-AF65-F5344CB8AC3E}">
         <p14:creationId xmlns:p14="http://schemas.microsoft.com/office/powerpoint/2010/main" val="2866300449"/>
+      </p:ext>
+    </p:extLst>
+  </p:cSld>
+  <p:clrMapOvr>
+    <a:masterClrMapping/>
+  </p:clrMapOvr>
+  <p:timing>
+    <p:tnLst>
+      <p:par>
+        <p:cTn id="1" dur="indefinite" restart="never" nodeType="tmRoot"/>
+      </p:par>
+    </p:tnLst>
+  </p:timing>
+</p:sld>
+</file>
+
+<file path=ppt/slides/slide4.xml><?xml version="1.0" encoding="utf-8"?>
+<p:sld xmlns:a="http://schemas.openxmlformats.org/drawingml/2006/main" xmlns:r="http://schemas.openxmlformats.org/officeDocument/2006/relationships" xmlns:p="http://schemas.openxmlformats.org/presentationml/2006/main">
+  <p:cSld>
+    <p:spTree>
+      <p:nvGrpSpPr>
+        <p:cNvPr id="1" name=""/>
+        <p:cNvGrpSpPr/>
+        <p:nvPr/>
+      </p:nvGrpSpPr>
+      <p:grpSpPr>
+        <a:xfrm>
+          <a:off x="0" y="0"/>
+          <a:ext cx="0" cy="0"/>
+          <a:chOff x="0" y="0"/>
+          <a:chExt cx="0" cy="0"/>
+        </a:xfrm>
+      </p:grpSpPr>
+      <p:sp>
+        <p:nvSpPr>
+          <p:cNvPr id="2" name="Rectangle 1"/>
+          <p:cNvSpPr/>
+          <p:nvPr/>
+        </p:nvSpPr>
+        <p:spPr>
+          <a:xfrm>
+            <a:off x="0" y="0"/>
+            <a:ext cx="6858000" cy="9906000"/>
+          </a:xfrm>
+          <a:prstGeom prst="rect">
+            <a:avLst/>
+          </a:prstGeom>
+          <a:solidFill>
+            <a:srgbClr val="FF8C52"/>
+          </a:solidFill>
+          <a:ln>
+            <a:noFill/>
+          </a:ln>
+        </p:spPr>
+        <p:style>
+          <a:lnRef idx="2">
+            <a:schemeClr val="accent1">
+              <a:shade val="50000"/>
+            </a:schemeClr>
+          </a:lnRef>
+          <a:fillRef idx="1">
+            <a:schemeClr val="accent1"/>
+          </a:fillRef>
+          <a:effectRef idx="0">
+            <a:schemeClr val="accent1"/>
+          </a:effectRef>
+          <a:fontRef idx="minor">
+            <a:schemeClr val="lt1"/>
+          </a:fontRef>
+        </p:style>
+        <p:txBody>
+          <a:bodyPr rtlCol="0" anchor="ctr"/>
+          <a:lstStyle/>
+          <a:p>
+            <a:pPr algn="ctr"/>
+            <a:endParaRPr lang="en-AU"/>
+          </a:p>
+        </p:txBody>
+      </p:sp>
+      <p:sp>
+        <p:nvSpPr>
+          <p:cNvPr id="12" name="TextBox 11"/>
+          <p:cNvSpPr txBox="1"/>
+          <p:nvPr/>
+        </p:nvSpPr>
+        <p:spPr>
+          <a:xfrm>
+            <a:off x="766645" y="4483690"/>
+            <a:ext cx="5342708" cy="1815882"/>
+          </a:xfrm>
+          <a:prstGeom prst="rect">
+            <a:avLst/>
+          </a:prstGeom>
+          <a:noFill/>
+        </p:spPr>
+        <p:txBody>
+          <a:bodyPr wrap="square" rtlCol="0">
+            <a:spAutoFit/>
+          </a:bodyPr>
+          <a:lstStyle/>
+          <a:p>
+            <a:pPr algn="ctr"/>
+            <a:r>
+              <a:rPr lang="en-US" sz="4400" b="1" cap="all" dirty="0" smtClean="0">
+                <a:solidFill>
+                  <a:schemeClr val="bg1"/>
+                </a:solidFill>
+                <a:latin typeface="Oxygen" panose="02000503000000000000" pitchFamily="2" charset="0"/>
+              </a:rPr>
+              <a:t>Avishek Sir</a:t>
+            </a:r>
+            <a:endParaRPr lang="en-US" sz="4400" b="1" cap="all" dirty="0" smtClean="0">
+              <a:solidFill>
+                <a:schemeClr val="bg1"/>
+              </a:solidFill>
+              <a:latin typeface="Oxygen" panose="02000503000000000000" pitchFamily="2" charset="0"/>
+            </a:endParaRPr>
+          </a:p>
+          <a:p>
+            <a:pPr algn="ctr"/>
+            <a:r>
+              <a:rPr lang="en-US" sz="2400" b="1" dirty="0" smtClean="0">
+                <a:solidFill>
+                  <a:schemeClr val="bg1"/>
+                </a:solidFill>
+                <a:latin typeface="Oxygen" panose="02000503000000000000" pitchFamily="2" charset="0"/>
+              </a:rPr>
+              <a:t>Avishek Adhikari</a:t>
+            </a:r>
+            <a:endParaRPr lang="en-US" sz="2800" b="1" dirty="0" smtClean="0">
+              <a:solidFill>
+                <a:schemeClr val="bg1"/>
+              </a:solidFill>
+              <a:latin typeface="Oxygen" panose="02000503000000000000" pitchFamily="2" charset="0"/>
+            </a:endParaRPr>
+          </a:p>
+          <a:p>
+            <a:pPr algn="ctr"/>
+            <a:endParaRPr lang="en-US" sz="1200" b="1" dirty="0" smtClean="0">
+              <a:solidFill>
+                <a:schemeClr val="bg1"/>
+              </a:solidFill>
+              <a:latin typeface="Oxygen" panose="02000503000000000000" pitchFamily="2" charset="0"/>
+            </a:endParaRPr>
+          </a:p>
+          <a:p>
+            <a:pPr algn="ctr"/>
+            <a:r>
+              <a:rPr lang="en-US" sz="2800" b="1" cap="small" dirty="0" smtClean="0">
+                <a:solidFill>
+                  <a:schemeClr val="bg1"/>
+                </a:solidFill>
+                <a:latin typeface="Oxygen" panose="02000503000000000000" pitchFamily="2" charset="0"/>
+              </a:rPr>
+              <a:t>Maths &amp; Physics </a:t>
+            </a:r>
+            <a:r>
+              <a:rPr lang="en-US" sz="2800" b="1" cap="small" dirty="0" smtClean="0">
+                <a:solidFill>
+                  <a:schemeClr val="bg1"/>
+                </a:solidFill>
+                <a:latin typeface="Oxygen" panose="02000503000000000000" pitchFamily="2" charset="0"/>
+              </a:rPr>
+              <a:t>- VIII – XII</a:t>
+            </a:r>
+            <a:endParaRPr lang="en-US" sz="1100" b="1" cap="small" dirty="0">
+              <a:solidFill>
+                <a:schemeClr val="bg1"/>
+              </a:solidFill>
+              <a:latin typeface="Oxygen" panose="02000503000000000000" pitchFamily="2" charset="0"/>
+            </a:endParaRPr>
+          </a:p>
+        </p:txBody>
+      </p:sp>
+      <p:sp>
+        <p:nvSpPr>
+          <p:cNvPr id="13" name="TextBox 12"/>
+          <p:cNvSpPr txBox="1"/>
+          <p:nvPr/>
+        </p:nvSpPr>
+        <p:spPr>
+          <a:xfrm>
+            <a:off x="190500" y="8213193"/>
+            <a:ext cx="6522720" cy="1246495"/>
+          </a:xfrm>
+          <a:prstGeom prst="rect">
+            <a:avLst/>
+          </a:prstGeom>
+          <a:noFill/>
+        </p:spPr>
+        <p:txBody>
+          <a:bodyPr wrap="square" rtlCol="0">
+            <a:spAutoFit/>
+          </a:bodyPr>
+          <a:lstStyle/>
+          <a:p>
+            <a:r>
+              <a:rPr lang="en-US" b="1" i="1" dirty="0" smtClean="0">
+                <a:solidFill>
+                  <a:schemeClr val="bg1"/>
+                </a:solidFill>
+                <a:latin typeface="Oxygen" panose="02000503000000000000" pitchFamily="2" charset="0"/>
+              </a:rPr>
+              <a:t>Neel depended on him so much to score !</a:t>
+            </a:r>
+            <a:endParaRPr lang="en-US" b="1" i="1" dirty="0" smtClean="0">
+              <a:solidFill>
+                <a:schemeClr val="bg1"/>
+              </a:solidFill>
+              <a:latin typeface="Oxygen" panose="02000503000000000000" pitchFamily="2" charset="0"/>
+            </a:endParaRPr>
+          </a:p>
+          <a:p>
+            <a:r>
+              <a:rPr lang="en-US" b="1" dirty="0">
+                <a:solidFill>
+                  <a:schemeClr val="bg1"/>
+                </a:solidFill>
+                <a:latin typeface="Oxygen" panose="02000503000000000000" pitchFamily="2" charset="0"/>
+              </a:rPr>
+              <a:t> </a:t>
+            </a:r>
+            <a:r>
+              <a:rPr lang="en-US" b="1" dirty="0" smtClean="0">
+                <a:solidFill>
+                  <a:schemeClr val="bg1"/>
+                </a:solidFill>
+                <a:latin typeface="Oxygen" panose="02000503000000000000" pitchFamily="2" charset="0"/>
+              </a:rPr>
+              <a:t>                                                                       </a:t>
+            </a:r>
+            <a:r>
+              <a:rPr lang="en-US" sz="1400" b="1" dirty="0" smtClean="0">
+                <a:solidFill>
+                  <a:schemeClr val="bg1"/>
+                </a:solidFill>
+                <a:latin typeface="Oxygen" panose="02000503000000000000" pitchFamily="2" charset="0"/>
+              </a:rPr>
+              <a:t>– </a:t>
+            </a:r>
+            <a:r>
+              <a:rPr lang="en-US" sz="1400" b="1" dirty="0" smtClean="0">
+                <a:solidFill>
+                  <a:schemeClr val="bg1"/>
+                </a:solidFill>
+                <a:latin typeface="Oxygen" panose="02000503000000000000" pitchFamily="2" charset="0"/>
+              </a:rPr>
+              <a:t>Neel’s </a:t>
+            </a:r>
+            <a:r>
+              <a:rPr lang="en-US" sz="1400" b="1" dirty="0" smtClean="0">
+                <a:solidFill>
+                  <a:schemeClr val="bg1"/>
+                </a:solidFill>
+                <a:latin typeface="Oxygen" panose="02000503000000000000" pitchFamily="2" charset="0"/>
+              </a:rPr>
+              <a:t>mother</a:t>
+            </a:r>
+          </a:p>
+          <a:p>
+            <a:endParaRPr lang="en-US" sz="300" b="1" dirty="0" smtClean="0">
+              <a:solidFill>
+                <a:schemeClr val="bg1"/>
+              </a:solidFill>
+              <a:latin typeface="Oxygen" panose="02000503000000000000" pitchFamily="2" charset="0"/>
+            </a:endParaRPr>
+          </a:p>
+          <a:p>
+            <a:r>
+              <a:rPr lang="en-US" b="1" i="1" dirty="0" smtClean="0">
+                <a:solidFill>
+                  <a:schemeClr val="bg1"/>
+                </a:solidFill>
+                <a:latin typeface="Oxygen" panose="02000503000000000000" pitchFamily="2" charset="0"/>
+              </a:rPr>
+              <a:t>Explains well, takes tests &amp; clears all doubts. Excellent!</a:t>
+            </a:r>
+          </a:p>
+          <a:p>
+            <a:r>
+              <a:rPr lang="en-US" b="1" dirty="0">
+                <a:solidFill>
+                  <a:schemeClr val="bg1"/>
+                </a:solidFill>
+                <a:latin typeface="Oxygen" panose="02000503000000000000" pitchFamily="2" charset="0"/>
+              </a:rPr>
+              <a:t> </a:t>
+            </a:r>
+            <a:r>
+              <a:rPr lang="en-US" b="1" dirty="0" smtClean="0">
+                <a:solidFill>
+                  <a:schemeClr val="bg1"/>
+                </a:solidFill>
+                <a:latin typeface="Oxygen" panose="02000503000000000000" pitchFamily="2" charset="0"/>
+              </a:rPr>
+              <a:t>                                                                       </a:t>
+            </a:r>
+            <a:r>
+              <a:rPr lang="en-US" sz="1400" b="1" dirty="0">
+                <a:solidFill>
+                  <a:schemeClr val="bg1"/>
+                </a:solidFill>
+                <a:latin typeface="Oxygen" panose="02000503000000000000" pitchFamily="2" charset="0"/>
+              </a:rPr>
+              <a:t>– Emon Kalsa’s </a:t>
+            </a:r>
+            <a:r>
+              <a:rPr lang="en-US" sz="1400" b="1" dirty="0" smtClean="0">
+                <a:solidFill>
+                  <a:schemeClr val="bg1"/>
+                </a:solidFill>
+                <a:latin typeface="Oxygen" panose="02000503000000000000" pitchFamily="2" charset="0"/>
+              </a:rPr>
+              <a:t>mother </a:t>
+            </a:r>
+            <a:endParaRPr lang="en-AU" sz="1400" b="1" dirty="0">
+              <a:solidFill>
+                <a:schemeClr val="bg1"/>
+              </a:solidFill>
+              <a:latin typeface="Oxygen" panose="02000503000000000000" pitchFamily="2" charset="0"/>
+            </a:endParaRPr>
+          </a:p>
+        </p:txBody>
+      </p:sp>
+      <p:sp>
+        <p:nvSpPr>
+          <p:cNvPr id="10" name="TextBox 9"/>
+          <p:cNvSpPr txBox="1"/>
+          <p:nvPr/>
+        </p:nvSpPr>
+        <p:spPr>
+          <a:xfrm>
+            <a:off x="295004" y="6408797"/>
+            <a:ext cx="3555272" cy="1569660"/>
+          </a:xfrm>
+          <a:prstGeom prst="rect">
+            <a:avLst/>
+          </a:prstGeom>
+          <a:noFill/>
+        </p:spPr>
+        <p:txBody>
+          <a:bodyPr wrap="square" rtlCol="0">
+            <a:spAutoFit/>
+          </a:bodyPr>
+          <a:lstStyle/>
+          <a:p>
+            <a:pPr marL="285750" indent="-285750">
+              <a:lnSpc>
+                <a:spcPct val="200000"/>
+              </a:lnSpc>
+              <a:buFont typeface="Wingdings" panose="05000000000000000000" pitchFamily="2" charset="2"/>
+              <a:buChar char="v"/>
+            </a:pPr>
+            <a:r>
+              <a:rPr lang="en-US" sz="1600" b="1" dirty="0" smtClean="0">
+                <a:solidFill>
+                  <a:schemeClr val="bg1"/>
+                </a:solidFill>
+                <a:latin typeface="Oxygen" panose="02000503000000000000" pitchFamily="2" charset="0"/>
+              </a:rPr>
+              <a:t>Cracked IIT, </a:t>
+            </a:r>
+            <a:r>
+              <a:rPr lang="en-US" sz="1600" b="1" dirty="0" smtClean="0">
+                <a:solidFill>
+                  <a:schemeClr val="bg1"/>
+                </a:solidFill>
+                <a:latin typeface="Oxygen" panose="02000503000000000000" pitchFamily="2" charset="0"/>
+              </a:rPr>
+              <a:t>I</a:t>
+            </a:r>
+            <a:r>
+              <a:rPr lang="en-US" sz="1600" b="1" dirty="0" smtClean="0">
+                <a:solidFill>
+                  <a:schemeClr val="bg1"/>
+                </a:solidFill>
+                <a:latin typeface="Oxygen" panose="02000503000000000000" pitchFamily="2" charset="0"/>
+              </a:rPr>
+              <a:t>SI PhD (Ongoing)</a:t>
+            </a:r>
+            <a:endParaRPr lang="en-US" sz="1600" b="1" dirty="0" smtClean="0">
+              <a:solidFill>
+                <a:schemeClr val="bg1"/>
+              </a:solidFill>
+              <a:latin typeface="Oxygen" panose="02000503000000000000" pitchFamily="2" charset="0"/>
+            </a:endParaRPr>
+          </a:p>
+          <a:p>
+            <a:pPr marL="285750" indent="-285750">
+              <a:lnSpc>
+                <a:spcPct val="200000"/>
+              </a:lnSpc>
+              <a:buFont typeface="Wingdings" panose="05000000000000000000" pitchFamily="2" charset="2"/>
+              <a:buChar char="v"/>
+            </a:pPr>
+            <a:r>
+              <a:rPr lang="en-US" sz="1600" b="1" dirty="0" smtClean="0">
+                <a:solidFill>
+                  <a:schemeClr val="bg1"/>
+                </a:solidFill>
+                <a:latin typeface="Oxygen" panose="02000503000000000000" pitchFamily="2" charset="0"/>
+              </a:rPr>
+              <a:t>8 Yrs Exp</a:t>
+            </a:r>
+            <a:r>
+              <a:rPr lang="en-US" sz="1600" b="1" dirty="0" smtClean="0">
+                <a:solidFill>
+                  <a:schemeClr val="bg1"/>
+                </a:solidFill>
+                <a:latin typeface="Oxygen" panose="02000503000000000000" pitchFamily="2" charset="0"/>
+              </a:rPr>
+              <a:t>. &amp; </a:t>
+            </a:r>
+            <a:r>
+              <a:rPr lang="en-US" sz="1600" b="1" dirty="0" smtClean="0">
+                <a:solidFill>
+                  <a:schemeClr val="bg1"/>
+                </a:solidFill>
+                <a:latin typeface="Oxygen" panose="02000503000000000000" pitchFamily="2" charset="0"/>
+              </a:rPr>
+              <a:t>Detail </a:t>
+            </a:r>
+            <a:r>
+              <a:rPr lang="en-US" sz="1600" b="1" dirty="0" smtClean="0">
+                <a:solidFill>
+                  <a:schemeClr val="bg1"/>
+                </a:solidFill>
+                <a:latin typeface="Oxygen" panose="02000503000000000000" pitchFamily="2" charset="0"/>
+              </a:rPr>
+              <a:t>Oriented</a:t>
+            </a:r>
+          </a:p>
+          <a:p>
+            <a:pPr marL="285750" indent="-285750">
+              <a:lnSpc>
+                <a:spcPct val="200000"/>
+              </a:lnSpc>
+              <a:buFont typeface="Wingdings" panose="05000000000000000000" pitchFamily="2" charset="2"/>
+              <a:buChar char="v"/>
+            </a:pPr>
+            <a:r>
+              <a:rPr lang="en-US" sz="1600" b="1" dirty="0" smtClean="0">
+                <a:solidFill>
+                  <a:schemeClr val="bg1"/>
+                </a:solidFill>
+                <a:latin typeface="Oxygen" panose="02000503000000000000" pitchFamily="2" charset="0"/>
+              </a:rPr>
+              <a:t>Lots of Successful Students</a:t>
+            </a:r>
+            <a:endParaRPr lang="en-AU" sz="1600" b="1" dirty="0">
+              <a:solidFill>
+                <a:schemeClr val="bg1"/>
+              </a:solidFill>
+              <a:latin typeface="Oxygen" panose="02000503000000000000" pitchFamily="2" charset="0"/>
+            </a:endParaRPr>
+          </a:p>
+        </p:txBody>
+      </p:sp>
+      <mc:AlternateContent xmlns:mc="http://schemas.openxmlformats.org/markup-compatibility/2006">
+        <mc:Choice xmlns:a14="http://schemas.microsoft.com/office/drawing/2010/main" Requires="a14">
+          <p:sp>
+            <p:nvSpPr>
+              <p:cNvPr id="14" name="TextBox 13"/>
+              <p:cNvSpPr txBox="1"/>
+              <p:nvPr/>
+            </p:nvSpPr>
+            <p:spPr>
+              <a:xfrm>
+                <a:off x="3706583" y="6395734"/>
+                <a:ext cx="3038790" cy="1677382"/>
+              </a:xfrm>
+              <a:prstGeom prst="rect">
+                <a:avLst/>
+              </a:prstGeom>
+              <a:noFill/>
+            </p:spPr>
+            <p:txBody>
+              <a:bodyPr wrap="square" rtlCol="0">
+                <a:spAutoFit/>
+              </a:bodyPr>
+              <a:lstStyle/>
+              <a:p>
+                <a:pPr marL="285750" indent="-285750">
+                  <a:lnSpc>
+                    <a:spcPct val="150000"/>
+                  </a:lnSpc>
+                  <a:buFont typeface="Wingdings" panose="05000000000000000000" pitchFamily="2" charset="2"/>
+                  <a:buChar char="v"/>
+                </a:pPr>
+                <a14:m>
+                  <m:oMath xmlns:m="http://schemas.openxmlformats.org/officeDocument/2006/math">
+                    <m:f>
+                      <m:fPr>
+                        <m:ctrlPr>
+                          <a:rPr lang="en-AU">
+                            <a:solidFill>
+                              <a:schemeClr val="bg1"/>
+                            </a:solidFill>
+                            <a:latin typeface="Oxygen" panose="02000503000000000000" pitchFamily="2" charset="0"/>
+                          </a:rPr>
+                        </m:ctrlPr>
+                      </m:fPr>
+                      <m:num>
+                        <m:r>
+                          <a:rPr lang="en-AU" b="0">
+                            <a:solidFill>
+                              <a:schemeClr val="bg1"/>
+                            </a:solidFill>
+                            <a:latin typeface="Oxygen" panose="02000503000000000000" pitchFamily="2" charset="0"/>
+                          </a:rPr>
+                          <m:t>100</m:t>
+                        </m:r>
+                      </m:num>
+                      <m:den>
+                        <m:r>
+                          <a:rPr lang="en-AU" b="0">
+                            <a:solidFill>
+                              <a:schemeClr val="bg1"/>
+                            </a:solidFill>
+                            <a:latin typeface="Oxygen" panose="02000503000000000000" pitchFamily="2" charset="0"/>
+                          </a:rPr>
+                          <m:t>100</m:t>
+                        </m:r>
+                      </m:den>
+                    </m:f>
+                  </m:oMath>
+                </a14:m>
+                <a:r>
+                  <a:rPr lang="en-US" sz="1600" b="1" dirty="0">
+                    <a:solidFill>
+                      <a:schemeClr val="bg1"/>
+                    </a:solidFill>
+                    <a:latin typeface="Oxygen" panose="02000503000000000000" pitchFamily="2" charset="0"/>
+                  </a:rPr>
+                  <a:t> in </a:t>
+                </a:r>
+                <a:r>
+                  <a:rPr lang="en-US" sz="1600" b="1" dirty="0" smtClean="0">
+                    <a:solidFill>
+                      <a:schemeClr val="bg1"/>
+                    </a:solidFill>
+                    <a:latin typeface="Oxygen" panose="02000503000000000000" pitchFamily="2" charset="0"/>
+                  </a:rPr>
+                  <a:t>Maths in HS &amp; 10</a:t>
+                </a:r>
+                <a:r>
+                  <a:rPr lang="en-US" sz="1600" b="1" baseline="30000" dirty="0" smtClean="0">
+                    <a:solidFill>
+                      <a:schemeClr val="bg1"/>
+                    </a:solidFill>
+                    <a:latin typeface="Oxygen" panose="02000503000000000000" pitchFamily="2" charset="0"/>
+                  </a:rPr>
+                  <a:t>th</a:t>
+                </a:r>
+                <a:r>
+                  <a:rPr lang="en-US" sz="1600" b="1" dirty="0" smtClean="0">
+                    <a:solidFill>
+                      <a:schemeClr val="bg1"/>
+                    </a:solidFill>
+                    <a:latin typeface="Oxygen" panose="02000503000000000000" pitchFamily="2" charset="0"/>
+                  </a:rPr>
+                  <a:t>   </a:t>
+                </a:r>
+              </a:p>
+              <a:p>
+                <a:pPr marL="285750" indent="-285750">
+                  <a:lnSpc>
+                    <a:spcPct val="200000"/>
+                  </a:lnSpc>
+                  <a:buFont typeface="Wingdings" panose="05000000000000000000" pitchFamily="2" charset="2"/>
+                  <a:buChar char="v"/>
+                </a:pPr>
+                <a:r>
+                  <a:rPr lang="en-US" sz="1600" b="1" dirty="0" smtClean="0">
+                    <a:solidFill>
+                      <a:schemeClr val="bg1"/>
+                    </a:solidFill>
+                    <a:latin typeface="Oxygen" panose="02000503000000000000" pitchFamily="2" charset="0"/>
+                  </a:rPr>
+                  <a:t>B.Sc. Math CU 1</a:t>
+                </a:r>
+                <a:r>
+                  <a:rPr lang="en-US" sz="1600" b="1" baseline="30000" dirty="0" smtClean="0">
+                    <a:solidFill>
+                      <a:schemeClr val="bg1"/>
+                    </a:solidFill>
+                    <a:latin typeface="Oxygen" panose="02000503000000000000" pitchFamily="2" charset="0"/>
+                  </a:rPr>
+                  <a:t>st</a:t>
+                </a:r>
+                <a:r>
+                  <a:rPr lang="en-US" sz="1600" b="1" dirty="0" smtClean="0">
+                    <a:solidFill>
+                      <a:schemeClr val="bg1"/>
+                    </a:solidFill>
+                    <a:latin typeface="Oxygen" panose="02000503000000000000" pitchFamily="2" charset="0"/>
+                  </a:rPr>
+                  <a:t> Class 1</a:t>
+                </a:r>
+                <a:r>
+                  <a:rPr lang="en-US" sz="1600" b="1" baseline="30000" dirty="0" smtClean="0">
+                    <a:solidFill>
+                      <a:schemeClr val="bg1"/>
+                    </a:solidFill>
+                    <a:latin typeface="Oxygen" panose="02000503000000000000" pitchFamily="2" charset="0"/>
+                  </a:rPr>
+                  <a:t>st</a:t>
+                </a:r>
+              </a:p>
+              <a:p>
+                <a:pPr marL="285750" indent="-285750">
+                  <a:lnSpc>
+                    <a:spcPct val="200000"/>
+                  </a:lnSpc>
+                  <a:buFont typeface="Wingdings" panose="05000000000000000000" pitchFamily="2" charset="2"/>
+                  <a:buChar char="v"/>
+                </a:pPr>
+                <a:r>
+                  <a:rPr lang="en-US" sz="1600" b="1" dirty="0" smtClean="0">
+                    <a:solidFill>
+                      <a:schemeClr val="bg1"/>
+                    </a:solidFill>
+                    <a:latin typeface="Oxygen" panose="02000503000000000000" pitchFamily="2" charset="0"/>
+                  </a:rPr>
+                  <a:t>M.Sc</a:t>
+                </a:r>
+                <a:r>
+                  <a:rPr lang="en-US" sz="1600" b="1" dirty="0">
+                    <a:solidFill>
+                      <a:schemeClr val="bg1"/>
+                    </a:solidFill>
+                    <a:latin typeface="Oxygen" panose="02000503000000000000" pitchFamily="2" charset="0"/>
+                  </a:rPr>
+                  <a:t>. Math CU 1</a:t>
+                </a:r>
+                <a:r>
+                  <a:rPr lang="en-US" sz="1600" b="1" baseline="30000" dirty="0">
+                    <a:solidFill>
+                      <a:schemeClr val="bg1"/>
+                    </a:solidFill>
+                    <a:latin typeface="Oxygen" panose="02000503000000000000" pitchFamily="2" charset="0"/>
+                  </a:rPr>
+                  <a:t>st</a:t>
+                </a:r>
+                <a:r>
+                  <a:rPr lang="en-US" sz="1600" b="1" dirty="0">
+                    <a:solidFill>
+                      <a:schemeClr val="bg1"/>
+                    </a:solidFill>
+                    <a:latin typeface="Oxygen" panose="02000503000000000000" pitchFamily="2" charset="0"/>
+                  </a:rPr>
+                  <a:t> Class </a:t>
+                </a:r>
+                <a:r>
+                  <a:rPr lang="en-US" sz="1600" b="1" dirty="0" smtClean="0">
+                    <a:solidFill>
+                      <a:schemeClr val="bg1"/>
+                    </a:solidFill>
+                    <a:latin typeface="Oxygen" panose="02000503000000000000" pitchFamily="2" charset="0"/>
+                  </a:rPr>
+                  <a:t>1</a:t>
+                </a:r>
+                <a:r>
+                  <a:rPr lang="en-US" sz="1600" b="1" baseline="30000" dirty="0" smtClean="0">
+                    <a:solidFill>
+                      <a:schemeClr val="bg1"/>
+                    </a:solidFill>
+                    <a:latin typeface="Oxygen" panose="02000503000000000000" pitchFamily="2" charset="0"/>
+                  </a:rPr>
+                  <a:t>st</a:t>
+                </a:r>
+                <a:endParaRPr lang="en-US" sz="1600" b="1" dirty="0" smtClean="0">
+                  <a:solidFill>
+                    <a:schemeClr val="bg1"/>
+                  </a:solidFill>
+                  <a:latin typeface="Oxygen" panose="02000503000000000000" pitchFamily="2" charset="0"/>
+                </a:endParaRPr>
+              </a:p>
+            </p:txBody>
+          </p:sp>
+        </mc:Choice>
+        <mc:Fallback>
+          <p:sp>
+            <p:nvSpPr>
+              <p:cNvPr id="14" name="TextBox 13"/>
+              <p:cNvSpPr txBox="1">
+                <a:spLocks noRot="1" noChangeAspect="1" noMove="1" noResize="1" noEditPoints="1" noAdjustHandles="1" noChangeArrowheads="1" noChangeShapeType="1" noTextEdit="1"/>
+              </p:cNvSpPr>
+              <p:nvPr/>
+            </p:nvSpPr>
+            <p:spPr>
+              <a:xfrm>
+                <a:off x="3706583" y="6395734"/>
+                <a:ext cx="3038790" cy="1677382"/>
+              </a:xfrm>
+              <a:prstGeom prst="rect">
+                <a:avLst/>
+              </a:prstGeom>
+              <a:blipFill rotWithShape="0">
+                <a:blip r:embed="rId3"/>
+                <a:stretch>
+                  <a:fillRect l="-1202"/>
+                </a:stretch>
+              </a:blipFill>
+            </p:spPr>
+            <p:txBody>
+              <a:bodyPr/>
+              <a:lstStyle/>
+              <a:p>
+                <a:r>
+                  <a:rPr lang="en-AU">
+                    <a:noFill/>
+                  </a:rPr>
+                  <a:t> </a:t>
+                </a:r>
+              </a:p>
+            </p:txBody>
+          </p:sp>
+        </mc:Fallback>
+      </mc:AlternateContent>
+      <p:pic>
+        <p:nvPicPr>
+          <p:cNvPr id="4" name="Picture 3"/>
+          <p:cNvPicPr>
+            <a:picLocks noChangeAspect="1"/>
+          </p:cNvPicPr>
+          <p:nvPr/>
+        </p:nvPicPr>
+        <p:blipFill>
+          <a:blip r:embed="rId4"/>
+          <a:stretch>
+            <a:fillRect/>
+          </a:stretch>
+        </p:blipFill>
+        <p:spPr>
+          <a:xfrm>
+            <a:off x="1477944" y="414300"/>
+            <a:ext cx="3946228" cy="3947728"/>
+          </a:xfrm>
+          <a:prstGeom prst="rect">
+            <a:avLst/>
+          </a:prstGeom>
+        </p:spPr>
+      </p:pic>
+      <p:sp>
+        <p:nvSpPr>
+          <p:cNvPr id="11" name="Rectangle 10"/>
+          <p:cNvSpPr/>
+          <p:nvPr/>
+        </p:nvSpPr>
+        <p:spPr>
+          <a:xfrm>
+            <a:off x="1442794" y="375334"/>
+            <a:ext cx="4016529" cy="4017435"/>
+          </a:xfrm>
+          <a:prstGeom prst="rect">
+            <a:avLst/>
+          </a:prstGeom>
+          <a:gradFill>
+            <a:gsLst>
+              <a:gs pos="70000">
+                <a:srgbClr val="FF8C52"/>
+              </a:gs>
+              <a:gs pos="62000">
+                <a:srgbClr val="FF8C52">
+                  <a:alpha val="0"/>
+                </a:srgbClr>
+              </a:gs>
+            </a:gsLst>
+            <a:path path="circle">
+              <a:fillToRect l="50000" t="50000" r="50000" b="50000"/>
+            </a:path>
+          </a:gradFill>
+          <a:ln>
+            <a:noFill/>
+          </a:ln>
+        </p:spPr>
+        <p:style>
+          <a:lnRef idx="2">
+            <a:schemeClr val="accent1">
+              <a:shade val="50000"/>
+            </a:schemeClr>
+          </a:lnRef>
+          <a:fillRef idx="1">
+            <a:schemeClr val="accent1"/>
+          </a:fillRef>
+          <a:effectRef idx="0">
+            <a:schemeClr val="accent1"/>
+          </a:effectRef>
+          <a:fontRef idx="minor">
+            <a:schemeClr val="lt1"/>
+          </a:fontRef>
+        </p:style>
+        <p:txBody>
+          <a:bodyPr rtlCol="0" anchor="ctr"/>
+          <a:lstStyle/>
+          <a:p>
+            <a:pPr algn="ctr"/>
+            <a:endParaRPr lang="en-AU"/>
+          </a:p>
+        </p:txBody>
+      </p:sp>
+    </p:spTree>
+    <p:extLst>
+      <p:ext uri="{BB962C8B-B14F-4D97-AF65-F5344CB8AC3E}">
+        <p14:creationId xmlns:p14="http://schemas.microsoft.com/office/powerpoint/2010/main" val="2320704513"/>
       </p:ext>
     </p:extLst>
   </p:cSld>

</xml_diff>